<commit_message>
Latest assignment written test ppt
</commit_message>
<xml_diff>
--- a/Assignment Written Document.pptx
+++ b/Assignment Written Document.pptx
@@ -633,7 +633,7 @@
           <a:p>
             <a:fld id="{4396DFCB-0D38-4A7C-9E6B-653490EF919E}" type="datetimeFigureOut">
               <a:rPr lang="en-IN" smtClean="0"/>
-              <a:t>04-05-2022</a:t>
+              <a:t>05-05-2022</a:t>
             </a:fld>
             <a:endParaRPr lang="en-IN"/>
           </a:p>
@@ -971,7 +971,7 @@
           <a:p>
             <a:fld id="{4396DFCB-0D38-4A7C-9E6B-653490EF919E}" type="datetimeFigureOut">
               <a:rPr lang="en-IN" smtClean="0"/>
-              <a:t>04-05-2022</a:t>
+              <a:t>05-05-2022</a:t>
             </a:fld>
             <a:endParaRPr lang="en-IN"/>
           </a:p>
@@ -1372,7 +1372,7 @@
           <a:p>
             <a:fld id="{4396DFCB-0D38-4A7C-9E6B-653490EF919E}" type="datetimeFigureOut">
               <a:rPr lang="en-IN" smtClean="0"/>
-              <a:t>04-05-2022</a:t>
+              <a:t>05-05-2022</a:t>
             </a:fld>
             <a:endParaRPr lang="en-IN"/>
           </a:p>
@@ -1708,7 +1708,7 @@
           <a:p>
             <a:fld id="{4396DFCB-0D38-4A7C-9E6B-653490EF919E}" type="datetimeFigureOut">
               <a:rPr lang="en-IN" smtClean="0"/>
-              <a:t>04-05-2022</a:t>
+              <a:t>05-05-2022</a:t>
             </a:fld>
             <a:endParaRPr lang="en-IN"/>
           </a:p>
@@ -2028,7 +2028,7 @@
           <a:p>
             <a:fld id="{4396DFCB-0D38-4A7C-9E6B-653490EF919E}" type="datetimeFigureOut">
               <a:rPr lang="en-IN" smtClean="0"/>
-              <a:t>04-05-2022</a:t>
+              <a:t>05-05-2022</a:t>
             </a:fld>
             <a:endParaRPr lang="en-IN"/>
           </a:p>
@@ -2424,7 +2424,7 @@
           <a:p>
             <a:fld id="{4396DFCB-0D38-4A7C-9E6B-653490EF919E}" type="datetimeFigureOut">
               <a:rPr lang="en-IN" smtClean="0"/>
-              <a:t>04-05-2022</a:t>
+              <a:t>05-05-2022</a:t>
             </a:fld>
             <a:endParaRPr lang="en-IN"/>
           </a:p>
@@ -2681,7 +2681,7 @@
           <a:p>
             <a:fld id="{4396DFCB-0D38-4A7C-9E6B-653490EF919E}" type="datetimeFigureOut">
               <a:rPr lang="en-IN" smtClean="0"/>
-              <a:t>04-05-2022</a:t>
+              <a:t>05-05-2022</a:t>
             </a:fld>
             <a:endParaRPr lang="en-IN"/>
           </a:p>
@@ -2943,7 +2943,7 @@
           <a:p>
             <a:fld id="{4396DFCB-0D38-4A7C-9E6B-653490EF919E}" type="datetimeFigureOut">
               <a:rPr lang="en-IN" smtClean="0"/>
-              <a:t>04-05-2022</a:t>
+              <a:t>05-05-2022</a:t>
             </a:fld>
             <a:endParaRPr lang="en-IN"/>
           </a:p>
@@ -3205,7 +3205,7 @@
           <a:p>
             <a:fld id="{4396DFCB-0D38-4A7C-9E6B-653490EF919E}" type="datetimeFigureOut">
               <a:rPr lang="en-IN" smtClean="0"/>
-              <a:t>04-05-2022</a:t>
+              <a:t>05-05-2022</a:t>
             </a:fld>
             <a:endParaRPr lang="en-IN"/>
           </a:p>
@@ -3534,7 +3534,7 @@
           <a:p>
             <a:fld id="{4396DFCB-0D38-4A7C-9E6B-653490EF919E}" type="datetimeFigureOut">
               <a:rPr lang="en-IN" smtClean="0"/>
-              <a:t>04-05-2022</a:t>
+              <a:t>05-05-2022</a:t>
             </a:fld>
             <a:endParaRPr lang="en-IN"/>
           </a:p>
@@ -3857,7 +3857,7 @@
           <a:p>
             <a:fld id="{4396DFCB-0D38-4A7C-9E6B-653490EF919E}" type="datetimeFigureOut">
               <a:rPr lang="en-IN" smtClean="0"/>
-              <a:t>04-05-2022</a:t>
+              <a:t>05-05-2022</a:t>
             </a:fld>
             <a:endParaRPr lang="en-IN"/>
           </a:p>
@@ -4314,7 +4314,7 @@
           <a:p>
             <a:fld id="{4396DFCB-0D38-4A7C-9E6B-653490EF919E}" type="datetimeFigureOut">
               <a:rPr lang="en-IN" smtClean="0"/>
-              <a:t>04-05-2022</a:t>
+              <a:t>05-05-2022</a:t>
             </a:fld>
             <a:endParaRPr lang="en-IN"/>
           </a:p>
@@ -4519,7 +4519,7 @@
           <a:p>
             <a:fld id="{4396DFCB-0D38-4A7C-9E6B-653490EF919E}" type="datetimeFigureOut">
               <a:rPr lang="en-IN" smtClean="0"/>
-              <a:t>04-05-2022</a:t>
+              <a:t>05-05-2022</a:t>
             </a:fld>
             <a:endParaRPr lang="en-IN"/>
           </a:p>
@@ -4696,7 +4696,7 @@
           <a:p>
             <a:fld id="{4396DFCB-0D38-4A7C-9E6B-653490EF919E}" type="datetimeFigureOut">
               <a:rPr lang="en-IN" smtClean="0"/>
-              <a:t>04-05-2022</a:t>
+              <a:t>05-05-2022</a:t>
             </a:fld>
             <a:endParaRPr lang="en-IN"/>
           </a:p>
@@ -5029,7 +5029,7 @@
           <a:p>
             <a:fld id="{4396DFCB-0D38-4A7C-9E6B-653490EF919E}" type="datetimeFigureOut">
               <a:rPr lang="en-IN" smtClean="0"/>
-              <a:t>04-05-2022</a:t>
+              <a:t>05-05-2022</a:t>
             </a:fld>
             <a:endParaRPr lang="en-IN"/>
           </a:p>
@@ -5374,7 +5374,7 @@
           <a:p>
             <a:fld id="{4396DFCB-0D38-4A7C-9E6B-653490EF919E}" type="datetimeFigureOut">
               <a:rPr lang="en-IN" smtClean="0"/>
-              <a:t>04-05-2022</a:t>
+              <a:t>05-05-2022</a:t>
             </a:fld>
             <a:endParaRPr lang="en-IN"/>
           </a:p>
@@ -7491,7 +7491,7 @@
           <a:p>
             <a:fld id="{4396DFCB-0D38-4A7C-9E6B-653490EF919E}" type="datetimeFigureOut">
               <a:rPr lang="en-IN" smtClean="0"/>
-              <a:t>04-05-2022</a:t>
+              <a:t>05-05-2022</a:t>
             </a:fld>
             <a:endParaRPr lang="en-IN"/>
           </a:p>
@@ -9723,7 +9723,9 @@
         </p:nvSpPr>
         <p:spPr/>
         <p:txBody>
-          <a:bodyPr/>
+          <a:bodyPr>
+            <a:normAutofit fontScale="92500" lnSpcReduction="20000"/>
+          </a:bodyPr>
           <a:lstStyle/>
           <a:p>
             <a:pPr marL="0" indent="0">
@@ -9756,25 +9758,38 @@
               <a:buChar char="v"/>
             </a:pPr>
             <a:r>
-              <a:rPr lang="en-IN" dirty="0">
-                <a:latin typeface="Times New Roman" panose="02020603050405020304" pitchFamily="18" charset="0"/>
-                <a:cs typeface="Times New Roman" panose="02020603050405020304" pitchFamily="18" charset="0"/>
-              </a:rPr>
-              <a:t>Background: Validation of Assignment Page </a:t>
-            </a:r>
-            <a:r>
-              <a:rPr lang="en-IN" dirty="0" err="1">
+              <a:rPr lang="en-US" dirty="0">
+                <a:latin typeface="Times New Roman" panose="02020603050405020304" pitchFamily="18" charset="0"/>
+                <a:cs typeface="Times New Roman" panose="02020603050405020304" pitchFamily="18" charset="0"/>
+              </a:rPr>
+              <a:t> Background: Validation of Assignment Page </a:t>
+            </a:r>
+            <a:r>
+              <a:rPr lang="en-US" dirty="0" err="1">
                 <a:latin typeface="Times New Roman" panose="02020603050405020304" pitchFamily="18" charset="0"/>
                 <a:cs typeface="Times New Roman" panose="02020603050405020304" pitchFamily="18" charset="0"/>
               </a:rPr>
               <a:t>webElements</a:t>
             </a:r>
             <a:r>
-              <a:rPr lang="en-IN" dirty="0">
-                <a:latin typeface="Times New Roman" panose="02020603050405020304" pitchFamily="18" charset="0"/>
-                <a:cs typeface="Times New Roman" panose="02020603050405020304" pitchFamily="18" charset="0"/>
-              </a:rPr>
-              <a:t> displayed</a:t>
+              <a:rPr lang="en-US" dirty="0">
+                <a:latin typeface="Times New Roman" panose="02020603050405020304" pitchFamily="18" charset="0"/>
+                <a:cs typeface="Times New Roman" panose="02020603050405020304" pitchFamily="18" charset="0"/>
+              </a:rPr>
+              <a:t> displayed   </a:t>
+            </a:r>
+          </a:p>
+          <a:p>
+            <a:pPr>
+              <a:buFont typeface="Courier New" panose="02070309020205020404" pitchFamily="49" charset="0"/>
+              <a:buChar char="o"/>
+            </a:pPr>
+            <a:r>
+              <a:rPr lang="en-US" dirty="0">
+                <a:latin typeface="Times New Roman" panose="02020603050405020304" pitchFamily="18" charset="0"/>
+                <a:cs typeface="Times New Roman" panose="02020603050405020304" pitchFamily="18" charset="0"/>
+              </a:rPr>
+              <a:t>User validates different UI fields present in the</a:t>
             </a:r>
           </a:p>
           <a:p>
@@ -9783,40 +9798,97 @@
               <a:buChar char="v"/>
             </a:pPr>
             <a:r>
-              <a:rPr lang="en-IN" dirty="0">
-                <a:latin typeface="Times New Roman" panose="02020603050405020304" pitchFamily="18" charset="0"/>
-                <a:cs typeface="Times New Roman" panose="02020603050405020304" pitchFamily="18" charset="0"/>
-              </a:rPr>
-              <a:t>Scenario: Validation of create question button functionality </a:t>
+              <a:rPr lang="en-US" dirty="0">
+                <a:latin typeface="Times New Roman" panose="02020603050405020304" pitchFamily="18" charset="0"/>
+                <a:cs typeface="Times New Roman" panose="02020603050405020304" pitchFamily="18" charset="0"/>
+              </a:rPr>
+              <a:t>Scenario: Validation of create question button functionality  </a:t>
             </a:r>
           </a:p>
           <a:p>
             <a:pPr>
-              <a:buFont typeface="Wingdings" panose="05000000000000000000" pitchFamily="2" charset="2"/>
-              <a:buChar char="v"/>
+              <a:buFont typeface="Courier New" panose="02070309020205020404" pitchFamily="49" charset="0"/>
+              <a:buChar char="o"/>
             </a:pPr>
             <a:r>
-              <a:rPr lang="en-IN" dirty="0">
-                <a:latin typeface="Times New Roman" panose="02020603050405020304" pitchFamily="18" charset="0"/>
-                <a:cs typeface="Times New Roman" panose="02020603050405020304" pitchFamily="18" charset="0"/>
-              </a:rPr>
-              <a:t>Scenario: Validation of Sort questions button functionality</a:t>
+              <a:rPr lang="en-US" dirty="0">
+                <a:latin typeface="Times New Roman" panose="02020603050405020304" pitchFamily="18" charset="0"/>
+                <a:cs typeface="Times New Roman" panose="02020603050405020304" pitchFamily="18" charset="0"/>
+              </a:rPr>
+              <a:t>User enter the details</a:t>
             </a:r>
           </a:p>
           <a:p>
             <a:pPr>
-              <a:buFont typeface="Wingdings" panose="05000000000000000000" pitchFamily="2" charset="2"/>
-              <a:buChar char="v"/>
+              <a:buFont typeface="Courier New" panose="02070309020205020404" pitchFamily="49" charset="0"/>
+              <a:buChar char="o"/>
             </a:pPr>
             <a:r>
-              <a:rPr lang="en-IN" dirty="0">
-                <a:latin typeface="Times New Roman" panose="02020603050405020304" pitchFamily="18" charset="0"/>
-                <a:cs typeface="Times New Roman" panose="02020603050405020304" pitchFamily="18" charset="0"/>
-              </a:rPr>
-              <a:t>Scenario: Validation of Remove questions button functionality</a:t>
-            </a:r>
-          </a:p>
-          <a:p>
+              <a:rPr lang="en-US" dirty="0">
+                <a:latin typeface="Times New Roman" panose="02020603050405020304" pitchFamily="18" charset="0"/>
+                <a:cs typeface="Times New Roman" panose="02020603050405020304" pitchFamily="18" charset="0"/>
+              </a:rPr>
+              <a:t>validates all the questions additions in the UI   </a:t>
+            </a:r>
+          </a:p>
+          <a:p>
+            <a:pPr>
+              <a:buFont typeface="Courier New" panose="02070309020205020404" pitchFamily="49" charset="0"/>
+              <a:buChar char="o"/>
+            </a:pPr>
+            <a:r>
+              <a:rPr lang="en-US" dirty="0">
+                <a:latin typeface="Times New Roman" panose="02020603050405020304" pitchFamily="18" charset="0"/>
+                <a:cs typeface="Times New Roman" panose="02020603050405020304" pitchFamily="18" charset="0"/>
+              </a:rPr>
+              <a:t> User clicks on Sort questions button   </a:t>
+            </a:r>
+          </a:p>
+          <a:p>
+            <a:pPr>
+              <a:buFont typeface="Courier New" panose="02070309020205020404" pitchFamily="49" charset="0"/>
+              <a:buChar char="o"/>
+            </a:pPr>
+            <a:r>
+              <a:rPr lang="en-US" dirty="0">
+                <a:latin typeface="Times New Roman" panose="02020603050405020304" pitchFamily="18" charset="0"/>
+                <a:cs typeface="Times New Roman" panose="02020603050405020304" pitchFamily="18" charset="0"/>
+              </a:rPr>
+              <a:t> User validates the sorted questions result </a:t>
+            </a:r>
+          </a:p>
+          <a:p>
+            <a:pPr>
+              <a:buFont typeface="Courier New" panose="02070309020205020404" pitchFamily="49" charset="0"/>
+              <a:buChar char="o"/>
+            </a:pPr>
+            <a:r>
+              <a:rPr lang="en-US" dirty="0">
+                <a:latin typeface="Times New Roman" panose="02020603050405020304" pitchFamily="18" charset="0"/>
+                <a:cs typeface="Times New Roman" panose="02020603050405020304" pitchFamily="18" charset="0"/>
+              </a:rPr>
+              <a:t> User clicks on Remove questions button   </a:t>
+            </a:r>
+          </a:p>
+          <a:p>
+            <a:pPr>
+              <a:buFont typeface="Courier New" panose="02070309020205020404" pitchFamily="49" charset="0"/>
+              <a:buChar char="o"/>
+            </a:pPr>
+            <a:r>
+              <a:rPr lang="en-US">
+                <a:latin typeface="Times New Roman" panose="02020603050405020304" pitchFamily="18" charset="0"/>
+                <a:cs typeface="Times New Roman" panose="02020603050405020304" pitchFamily="18" charset="0"/>
+              </a:rPr>
+              <a:t> User </a:t>
+            </a:r>
+            <a:r>
+              <a:rPr lang="en-US" dirty="0">
+                <a:latin typeface="Times New Roman" panose="02020603050405020304" pitchFamily="18" charset="0"/>
+                <a:cs typeface="Times New Roman" panose="02020603050405020304" pitchFamily="18" charset="0"/>
+              </a:rPr>
+              <a:t>validates the Remove questions result</a:t>
+            </a:r>
             <a:endParaRPr lang="en-IN" dirty="0"/>
           </a:p>
         </p:txBody>

</xml_diff>

<commit_message>
Final Assignment written test PPT
</commit_message>
<xml_diff>
--- a/Assignment Written Document.pptx
+++ b/Assignment Written Document.pptx
@@ -127,7 +127,7 @@
   <pc:docChgLst>
     <pc:chgData name="Suraj Singh" userId="c216fb6d00da982e" providerId="LiveId" clId="{CB03B59C-8BE2-4C4F-890A-A58706CAB948}"/>
     <pc:docChg chg="undo custSel addSld modSld">
-      <pc:chgData name="Suraj Singh" userId="c216fb6d00da982e" providerId="LiveId" clId="{CB03B59C-8BE2-4C4F-890A-A58706CAB948}" dt="2022-05-04T15:57:26.477" v="1971" actId="20577"/>
+      <pc:chgData name="Suraj Singh" userId="c216fb6d00da982e" providerId="LiveId" clId="{CB03B59C-8BE2-4C4F-890A-A58706CAB948}" dt="2022-05-05T02:01:53.725" v="1975" actId="20577"/>
       <pc:docMkLst>
         <pc:docMk/>
       </pc:docMkLst>
@@ -239,13 +239,13 @@
         </pc:picChg>
       </pc:sldChg>
       <pc:sldChg chg="modSp mod">
-        <pc:chgData name="Suraj Singh" userId="c216fb6d00da982e" providerId="LiveId" clId="{CB03B59C-8BE2-4C4F-890A-A58706CAB948}" dt="2022-05-04T15:35:27.356" v="1231" actId="5793"/>
+        <pc:chgData name="Suraj Singh" userId="c216fb6d00da982e" providerId="LiveId" clId="{CB03B59C-8BE2-4C4F-890A-A58706CAB948}" dt="2022-05-05T02:01:53.725" v="1975" actId="20577"/>
         <pc:sldMkLst>
           <pc:docMk/>
           <pc:sldMk cId="813970686" sldId="261"/>
         </pc:sldMkLst>
         <pc:spChg chg="mod">
-          <ac:chgData name="Suraj Singh" userId="c216fb6d00da982e" providerId="LiveId" clId="{CB03B59C-8BE2-4C4F-890A-A58706CAB948}" dt="2022-05-04T15:35:27.356" v="1231" actId="5793"/>
+          <ac:chgData name="Suraj Singh" userId="c216fb6d00da982e" providerId="LiveId" clId="{CB03B59C-8BE2-4C4F-890A-A58706CAB948}" dt="2022-05-05T02:01:53.725" v="1975" actId="20577"/>
           <ac:spMkLst>
             <pc:docMk/>
             <pc:sldMk cId="813970686" sldId="261"/>
@@ -9789,7 +9789,7 @@
                 <a:latin typeface="Times New Roman" panose="02020603050405020304" pitchFamily="18" charset="0"/>
                 <a:cs typeface="Times New Roman" panose="02020603050405020304" pitchFamily="18" charset="0"/>
               </a:rPr>
-              <a:t>User validates different UI fields present in the</a:t>
+              <a:t>User validates different UI fields present in the page</a:t>
             </a:r>
           </a:p>
           <a:p>
@@ -9828,7 +9828,21 @@
                 <a:latin typeface="Times New Roman" panose="02020603050405020304" pitchFamily="18" charset="0"/>
                 <a:cs typeface="Times New Roman" panose="02020603050405020304" pitchFamily="18" charset="0"/>
               </a:rPr>
-              <a:t>validates all the questions additions in the UI   </a:t>
+              <a:t>V</a:t>
+            </a:r>
+            <a:r>
+              <a:rPr lang="en-US">
+                <a:latin typeface="Times New Roman" panose="02020603050405020304" pitchFamily="18" charset="0"/>
+                <a:cs typeface="Times New Roman" panose="02020603050405020304" pitchFamily="18" charset="0"/>
+              </a:rPr>
+              <a:t>alidates </a:t>
+            </a:r>
+            <a:r>
+              <a:rPr lang="en-US" dirty="0">
+                <a:latin typeface="Times New Roman" panose="02020603050405020304" pitchFamily="18" charset="0"/>
+                <a:cs typeface="Times New Roman" panose="02020603050405020304" pitchFamily="18" charset="0"/>
+              </a:rPr>
+              <a:t>all the questions additions in the UI   </a:t>
             </a:r>
           </a:p>
           <a:p>
@@ -9876,18 +9890,11 @@
               <a:buChar char="o"/>
             </a:pPr>
             <a:r>
-              <a:rPr lang="en-US">
-                <a:latin typeface="Times New Roman" panose="02020603050405020304" pitchFamily="18" charset="0"/>
-                <a:cs typeface="Times New Roman" panose="02020603050405020304" pitchFamily="18" charset="0"/>
-              </a:rPr>
-              <a:t> User </a:t>
-            </a:r>
-            <a:r>
               <a:rPr lang="en-US" dirty="0">
                 <a:latin typeface="Times New Roman" panose="02020603050405020304" pitchFamily="18" charset="0"/>
                 <a:cs typeface="Times New Roman" panose="02020603050405020304" pitchFamily="18" charset="0"/>
               </a:rPr>
-              <a:t>validates the Remove questions result</a:t>
+              <a:t> User validates the Remove questions result</a:t>
             </a:r>
             <a:endParaRPr lang="en-IN" dirty="0"/>
           </a:p>

</xml_diff>